<commit_message>
update examples and doc
</commit_message>
<xml_diff>
--- a/documentation/Interaction_examples_visual.pptx
+++ b/documentation/Interaction_examples_visual.pptx
@@ -282,7 +282,7 @@
           <a:p>
             <a:fld id="{CC17145A-0342-4924-840D-BBCF9AF95DAD}" type="datetimeFigureOut">
               <a:rPr lang="en-US" smtClean="0"/>
-              <a:t>28-Feb-20</a:t>
+              <a:t>12-Jan-21</a:t>
             </a:fld>
             <a:endParaRPr lang="en-US"/>
           </a:p>
@@ -480,7 +480,7 @@
           <a:p>
             <a:fld id="{CC17145A-0342-4924-840D-BBCF9AF95DAD}" type="datetimeFigureOut">
               <a:rPr lang="en-US" smtClean="0"/>
-              <a:t>28-Feb-20</a:t>
+              <a:t>12-Jan-21</a:t>
             </a:fld>
             <a:endParaRPr lang="en-US"/>
           </a:p>
@@ -688,7 +688,7 @@
           <a:p>
             <a:fld id="{CC17145A-0342-4924-840D-BBCF9AF95DAD}" type="datetimeFigureOut">
               <a:rPr lang="en-US" smtClean="0"/>
-              <a:t>28-Feb-20</a:t>
+              <a:t>12-Jan-21</a:t>
             </a:fld>
             <a:endParaRPr lang="en-US"/>
           </a:p>
@@ -886,7 +886,7 @@
           <a:p>
             <a:fld id="{CC17145A-0342-4924-840D-BBCF9AF95DAD}" type="datetimeFigureOut">
               <a:rPr lang="en-US" smtClean="0"/>
-              <a:t>28-Feb-20</a:t>
+              <a:t>12-Jan-21</a:t>
             </a:fld>
             <a:endParaRPr lang="en-US"/>
           </a:p>
@@ -1161,7 +1161,7 @@
           <a:p>
             <a:fld id="{CC17145A-0342-4924-840D-BBCF9AF95DAD}" type="datetimeFigureOut">
               <a:rPr lang="en-US" smtClean="0"/>
-              <a:t>28-Feb-20</a:t>
+              <a:t>12-Jan-21</a:t>
             </a:fld>
             <a:endParaRPr lang="en-US"/>
           </a:p>
@@ -1426,7 +1426,7 @@
           <a:p>
             <a:fld id="{CC17145A-0342-4924-840D-BBCF9AF95DAD}" type="datetimeFigureOut">
               <a:rPr lang="en-US" smtClean="0"/>
-              <a:t>28-Feb-20</a:t>
+              <a:t>12-Jan-21</a:t>
             </a:fld>
             <a:endParaRPr lang="en-US"/>
           </a:p>
@@ -1838,7 +1838,7 @@
           <a:p>
             <a:fld id="{CC17145A-0342-4924-840D-BBCF9AF95DAD}" type="datetimeFigureOut">
               <a:rPr lang="en-US" smtClean="0"/>
-              <a:t>28-Feb-20</a:t>
+              <a:t>12-Jan-21</a:t>
             </a:fld>
             <a:endParaRPr lang="en-US"/>
           </a:p>
@@ -1979,7 +1979,7 @@
           <a:p>
             <a:fld id="{CC17145A-0342-4924-840D-BBCF9AF95DAD}" type="datetimeFigureOut">
               <a:rPr lang="en-US" smtClean="0"/>
-              <a:t>28-Feb-20</a:t>
+              <a:t>12-Jan-21</a:t>
             </a:fld>
             <a:endParaRPr lang="en-US"/>
           </a:p>
@@ -2092,7 +2092,7 @@
           <a:p>
             <a:fld id="{CC17145A-0342-4924-840D-BBCF9AF95DAD}" type="datetimeFigureOut">
               <a:rPr lang="en-US" smtClean="0"/>
-              <a:t>28-Feb-20</a:t>
+              <a:t>12-Jan-21</a:t>
             </a:fld>
             <a:endParaRPr lang="en-US"/>
           </a:p>
@@ -2403,7 +2403,7 @@
           <a:p>
             <a:fld id="{CC17145A-0342-4924-840D-BBCF9AF95DAD}" type="datetimeFigureOut">
               <a:rPr lang="en-US" smtClean="0"/>
-              <a:t>28-Feb-20</a:t>
+              <a:t>12-Jan-21</a:t>
             </a:fld>
             <a:endParaRPr lang="en-US"/>
           </a:p>
@@ -2691,7 +2691,7 @@
           <a:p>
             <a:fld id="{CC17145A-0342-4924-840D-BBCF9AF95DAD}" type="datetimeFigureOut">
               <a:rPr lang="en-US" smtClean="0"/>
-              <a:t>28-Feb-20</a:t>
+              <a:t>12-Jan-21</a:t>
             </a:fld>
             <a:endParaRPr lang="en-US"/>
           </a:p>
@@ -2932,7 +2932,7 @@
           <a:p>
             <a:fld id="{CC17145A-0342-4924-840D-BBCF9AF95DAD}" type="datetimeFigureOut">
               <a:rPr lang="en-US" smtClean="0"/>
-              <a:t>28-Feb-20</a:t>
+              <a:t>12-Jan-21</a:t>
             </a:fld>
             <a:endParaRPr lang="en-US"/>
           </a:p>
@@ -3372,14 +3372,14 @@
           <a:p>
             <a:r>
               <a:rPr lang="en-US" dirty="0"/>
-              <a:t>Interaction examples</a:t>
+              <a:t>Interaction visual examples</a:t>
             </a:r>
             <a:br>
               <a:rPr lang="en-US" dirty="0"/>
             </a:br>
             <a:r>
               <a:rPr lang="en-US" sz="4000" dirty="0"/>
-              <a:t>(including LCE and L&amp;T)</a:t>
+              <a:t>(including DITA L&amp;T and LCE)</a:t>
             </a:r>
           </a:p>
         </p:txBody>
@@ -3400,21 +3400,26 @@
             <p:ph type="subTitle" idx="1"/>
           </p:nvPr>
         </p:nvSpPr>
-        <p:spPr/>
+        <p:spPr>
+          <a:xfrm>
+            <a:off x="1524000" y="3934052"/>
+            <a:ext cx="9144000" cy="1655762"/>
+          </a:xfrm>
+        </p:spPr>
         <p:txBody>
           <a:bodyPr/>
           <a:lstStyle/>
           <a:p>
             <a:pPr algn="l"/>
             <a:r>
-              <a:rPr lang="en-US" dirty="0"/>
-              <a:t>Interactions could look like this for the students.</a:t>
+              <a:rPr lang="en-US" i="1" dirty="0"/>
+              <a:t>Interactions possibly could look like this for the students.  </a:t>
             </a:r>
           </a:p>
           <a:p>
             <a:pPr algn="l"/>
             <a:r>
-              <a:rPr lang="en-US" dirty="0"/>
+              <a:rPr lang="en-US" i="1" dirty="0"/>
               <a:t>In grey the answers are given.</a:t>
             </a:r>
           </a:p>
@@ -3473,7 +3478,7 @@
           <a:p>
             <a:r>
               <a:rPr lang="en-US" dirty="0"/>
-              <a:t>LCE examples</a:t>
+              <a:t>Specialization LCE examples</a:t>
             </a:r>
           </a:p>
         </p:txBody>
@@ -3523,6 +3528,13 @@
             <a:r>
               <a:rPr lang="en-US" dirty="0" err="1"/>
               <a:t>lceGraphicTextEntry</a:t>
+            </a:r>
+            <a:endParaRPr lang="en-US" dirty="0"/>
+          </a:p>
+          <a:p>
+            <a:r>
+              <a:rPr lang="en-US" dirty="0" err="1"/>
+              <a:t>lceGraphicAssociate</a:t>
             </a:r>
             <a:endParaRPr lang="en-US" dirty="0"/>
           </a:p>
@@ -5167,13 +5179,8 @@
             </a:r>
             <a:r>
               <a:rPr lang="en-US" sz="1800" dirty="0"/>
-              <a:t> with </a:t>
-            </a:r>
-            <a:r>
-              <a:rPr lang="en-US" sz="1800" dirty="0" err="1"/>
-              <a:t>lceStartEntry</a:t>
-            </a:r>
-            <a:endParaRPr lang="en-US" sz="1800" dirty="0"/>
+              <a:t> (with @answertype=“fixed”)</a:t>
+            </a:r>
           </a:p>
         </p:txBody>
       </p:sp>
@@ -6830,7 +6837,7 @@
           <a:p>
             <a:r>
               <a:rPr lang="en-US" dirty="0"/>
-              <a:t>L&amp;T examples</a:t>
+              <a:t>DITA L&amp;T examples</a:t>
             </a:r>
           </a:p>
         </p:txBody>

</xml_diff>

<commit_message>
Update examples, deleted not used modules
</commit_message>
<xml_diff>
--- a/documentation/Interaction_examples_visual.pptx
+++ b/documentation/Interaction_examples_visual.pptx
@@ -29,8 +29,9 @@
     <p:sldId id="262" r:id="rId23"/>
     <p:sldId id="261" r:id="rId24"/>
     <p:sldId id="281" r:id="rId25"/>
-    <p:sldId id="265" r:id="rId26"/>
-    <p:sldId id="266" r:id="rId27"/>
+    <p:sldId id="282" r:id="rId26"/>
+    <p:sldId id="265" r:id="rId27"/>
+    <p:sldId id="266" r:id="rId28"/>
   </p:sldIdLst>
   <p:sldSz cx="12192000" cy="6858000"/>
   <p:notesSz cx="6858000" cy="9144000"/>
@@ -284,7 +285,7 @@
           <a:p>
             <a:fld id="{CC17145A-0342-4924-840D-BBCF9AF95DAD}" type="datetimeFigureOut">
               <a:rPr lang="en-US" smtClean="0"/>
-              <a:t>3/24/2022</a:t>
+              <a:t>4/3/2022</a:t>
             </a:fld>
             <a:endParaRPr lang="en-US"/>
           </a:p>
@@ -482,7 +483,7 @@
           <a:p>
             <a:fld id="{CC17145A-0342-4924-840D-BBCF9AF95DAD}" type="datetimeFigureOut">
               <a:rPr lang="en-US" smtClean="0"/>
-              <a:t>3/24/2022</a:t>
+              <a:t>4/3/2022</a:t>
             </a:fld>
             <a:endParaRPr lang="en-US"/>
           </a:p>
@@ -690,7 +691,7 @@
           <a:p>
             <a:fld id="{CC17145A-0342-4924-840D-BBCF9AF95DAD}" type="datetimeFigureOut">
               <a:rPr lang="en-US" smtClean="0"/>
-              <a:t>3/24/2022</a:t>
+              <a:t>4/3/2022</a:t>
             </a:fld>
             <a:endParaRPr lang="en-US"/>
           </a:p>
@@ -888,7 +889,7 @@
           <a:p>
             <a:fld id="{CC17145A-0342-4924-840D-BBCF9AF95DAD}" type="datetimeFigureOut">
               <a:rPr lang="en-US" smtClean="0"/>
-              <a:t>3/24/2022</a:t>
+              <a:t>4/3/2022</a:t>
             </a:fld>
             <a:endParaRPr lang="en-US"/>
           </a:p>
@@ -1163,7 +1164,7 @@
           <a:p>
             <a:fld id="{CC17145A-0342-4924-840D-BBCF9AF95DAD}" type="datetimeFigureOut">
               <a:rPr lang="en-US" smtClean="0"/>
-              <a:t>3/24/2022</a:t>
+              <a:t>4/3/2022</a:t>
             </a:fld>
             <a:endParaRPr lang="en-US"/>
           </a:p>
@@ -1428,7 +1429,7 @@
           <a:p>
             <a:fld id="{CC17145A-0342-4924-840D-BBCF9AF95DAD}" type="datetimeFigureOut">
               <a:rPr lang="en-US" smtClean="0"/>
-              <a:t>3/24/2022</a:t>
+              <a:t>4/3/2022</a:t>
             </a:fld>
             <a:endParaRPr lang="en-US"/>
           </a:p>
@@ -1840,7 +1841,7 @@
           <a:p>
             <a:fld id="{CC17145A-0342-4924-840D-BBCF9AF95DAD}" type="datetimeFigureOut">
               <a:rPr lang="en-US" smtClean="0"/>
-              <a:t>3/24/2022</a:t>
+              <a:t>4/3/2022</a:t>
             </a:fld>
             <a:endParaRPr lang="en-US"/>
           </a:p>
@@ -1981,7 +1982,7 @@
           <a:p>
             <a:fld id="{CC17145A-0342-4924-840D-BBCF9AF95DAD}" type="datetimeFigureOut">
               <a:rPr lang="en-US" smtClean="0"/>
-              <a:t>3/24/2022</a:t>
+              <a:t>4/3/2022</a:t>
             </a:fld>
             <a:endParaRPr lang="en-US"/>
           </a:p>
@@ -2094,7 +2095,7 @@
           <a:p>
             <a:fld id="{CC17145A-0342-4924-840D-BBCF9AF95DAD}" type="datetimeFigureOut">
               <a:rPr lang="en-US" smtClean="0"/>
-              <a:t>3/24/2022</a:t>
+              <a:t>4/3/2022</a:t>
             </a:fld>
             <a:endParaRPr lang="en-US"/>
           </a:p>
@@ -2405,7 +2406,7 @@
           <a:p>
             <a:fld id="{CC17145A-0342-4924-840D-BBCF9AF95DAD}" type="datetimeFigureOut">
               <a:rPr lang="en-US" smtClean="0"/>
-              <a:t>3/24/2022</a:t>
+              <a:t>4/3/2022</a:t>
             </a:fld>
             <a:endParaRPr lang="en-US"/>
           </a:p>
@@ -2693,7 +2694,7 @@
           <a:p>
             <a:fld id="{CC17145A-0342-4924-840D-BBCF9AF95DAD}" type="datetimeFigureOut">
               <a:rPr lang="en-US" smtClean="0"/>
-              <a:t>3/24/2022</a:t>
+              <a:t>4/3/2022</a:t>
             </a:fld>
             <a:endParaRPr lang="en-US"/>
           </a:p>
@@ -2934,7 +2935,7 @@
           <a:p>
             <a:fld id="{CC17145A-0342-4924-840D-BBCF9AF95DAD}" type="datetimeFigureOut">
               <a:rPr lang="en-US" smtClean="0"/>
-              <a:t>3/24/2022</a:t>
+              <a:t>4/3/2022</a:t>
             </a:fld>
             <a:endParaRPr lang="en-US"/>
           </a:p>
@@ -3474,8 +3475,19 @@
           <a:lstStyle/>
           <a:p>
             <a:r>
+              <a:rPr lang="en-US" dirty="0" err="1"/>
+              <a:t>Xstructuring</a:t>
+            </a:r>
+            <a:r>
               <a:rPr lang="en-US" dirty="0"/>
-              <a:t>LCE examples</a:t>
+              <a:t> - LCE </a:t>
+            </a:r>
+            <a:br>
+              <a:rPr lang="en-US" dirty="0"/>
+            </a:br>
+            <a:r>
+              <a:rPr lang="en-US" dirty="0"/>
+              <a:t>examples</a:t>
             </a:r>
           </a:p>
         </p:txBody>
@@ -3498,7 +3510,9 @@
         </p:nvSpPr>
         <p:spPr/>
         <p:txBody>
-          <a:bodyPr/>
+          <a:bodyPr>
+            <a:normAutofit fontScale="92500" lnSpcReduction="10000"/>
+          </a:bodyPr>
           <a:lstStyle/>
           <a:p>
             <a:r>
@@ -3562,7 +3576,9 @@
         </p:nvSpPr>
         <p:spPr/>
         <p:txBody>
-          <a:bodyPr/>
+          <a:bodyPr>
+            <a:normAutofit fontScale="92500" lnSpcReduction="10000"/>
+          </a:bodyPr>
           <a:lstStyle/>
           <a:p>
             <a:r>
@@ -3574,6 +3590,16 @@
           <a:p>
             <a:r>
               <a:rPr lang="en-US" dirty="0" err="1"/>
+              <a:t>lceTextEntry</a:t>
+            </a:r>
+            <a:r>
+              <a:rPr lang="en-US" dirty="0"/>
+              <a:t> variant with calculation</a:t>
+            </a:r>
+          </a:p>
+          <a:p>
+            <a:r>
+              <a:rPr lang="en-US" dirty="0" err="1"/>
               <a:t>lceGapMatch</a:t>
             </a:r>
             <a:endParaRPr lang="en-US" dirty="0"/>
@@ -3589,6 +3615,23 @@
             <a:r>
               <a:rPr lang="en-US" dirty="0" err="1"/>
               <a:t>lceHottext</a:t>
+            </a:r>
+            <a:endParaRPr lang="en-US" dirty="0"/>
+          </a:p>
+          <a:p>
+            <a:r>
+              <a:rPr lang="en-US" dirty="0" err="1"/>
+              <a:t>lceHottext</a:t>
+            </a:r>
+            <a:r>
+              <a:rPr lang="en-US" dirty="0"/>
+              <a:t> variant with meaning</a:t>
+            </a:r>
+          </a:p>
+          <a:p>
+            <a:r>
+              <a:rPr lang="en-US" dirty="0" err="1"/>
+              <a:t>lceInlineOrder</a:t>
             </a:r>
             <a:endParaRPr lang="en-US" dirty="0"/>
           </a:p>
@@ -6832,7 +6875,14 @@
           <a:p>
             <a:r>
               <a:rPr lang="en-US" dirty="0"/>
-              <a:t>L&amp;T examples</a:t>
+              <a:t>OASIS DITA L&amp;T </a:t>
+            </a:r>
+            <a:br>
+              <a:rPr lang="en-US" dirty="0"/>
+            </a:br>
+            <a:r>
+              <a:rPr lang="en-US" dirty="0"/>
+              <a:t>examples</a:t>
             </a:r>
           </a:p>
         </p:txBody>
@@ -8043,7 +8093,7 @@
             </a:pPr>
             <a:r>
               <a:rPr lang="en-US" dirty="0"/>
-              <a:t>Daniels </a:t>
+              <a:t>Daniel </a:t>
             </a:r>
             <a:r>
               <a:rPr lang="en-US" dirty="0">
@@ -8164,6 +8214,382 @@
 </file>
 
 <file path=ppt/slides/slide25.xml><?xml version="1.0" encoding="utf-8"?>
+<p:sld xmlns:a="http://schemas.openxmlformats.org/drawingml/2006/main" xmlns:r="http://schemas.openxmlformats.org/officeDocument/2006/relationships" xmlns:p="http://schemas.openxmlformats.org/presentationml/2006/main">
+  <p:cSld>
+    <p:spTree>
+      <p:nvGrpSpPr>
+        <p:cNvPr id="1" name=""/>
+        <p:cNvGrpSpPr/>
+        <p:nvPr/>
+      </p:nvGrpSpPr>
+      <p:grpSpPr>
+        <a:xfrm>
+          <a:off x="0" y="0"/>
+          <a:ext cx="0" cy="0"/>
+          <a:chOff x="0" y="0"/>
+          <a:chExt cx="0" cy="0"/>
+        </a:xfrm>
+      </p:grpSpPr>
+      <p:sp>
+        <p:nvSpPr>
+          <p:cNvPr id="2" name="Title 1">
+            <a:extLst>
+              <a:ext uri="{FF2B5EF4-FFF2-40B4-BE49-F238E27FC236}">
+                <a16:creationId xmlns:a16="http://schemas.microsoft.com/office/drawing/2014/main" id="{17546CFD-B71A-4805-8A6B-CAD10705209B}"/>
+              </a:ext>
+            </a:extLst>
+          </p:cNvPr>
+          <p:cNvSpPr>
+            <a:spLocks noGrp="1"/>
+          </p:cNvSpPr>
+          <p:nvPr>
+            <p:ph type="title"/>
+          </p:nvPr>
+        </p:nvSpPr>
+        <p:spPr/>
+        <p:txBody>
+          <a:bodyPr>
+            <a:normAutofit/>
+          </a:bodyPr>
+          <a:lstStyle/>
+          <a:p>
+            <a:r>
+              <a:rPr lang="en-US" sz="1800" dirty="0" err="1"/>
+              <a:t>lceInlineOrder</a:t>
+            </a:r>
+            <a:endParaRPr lang="en-US" sz="1800" dirty="0"/>
+          </a:p>
+        </p:txBody>
+      </p:sp>
+      <p:sp>
+        <p:nvSpPr>
+          <p:cNvPr id="3" name="Content Placeholder 2">
+            <a:extLst>
+              <a:ext uri="{FF2B5EF4-FFF2-40B4-BE49-F238E27FC236}">
+                <a16:creationId xmlns:a16="http://schemas.microsoft.com/office/drawing/2014/main" id="{A1AE635E-6BEE-4A3D-BEC1-B1DA65CC3055}"/>
+              </a:ext>
+            </a:extLst>
+          </p:cNvPr>
+          <p:cNvSpPr>
+            <a:spLocks noGrp="1"/>
+          </p:cNvSpPr>
+          <p:nvPr>
+            <p:ph idx="1"/>
+          </p:nvPr>
+        </p:nvSpPr>
+        <p:spPr>
+          <a:xfrm>
+            <a:off x="838200" y="1400458"/>
+            <a:ext cx="10515600" cy="4351338"/>
+          </a:xfrm>
+        </p:spPr>
+        <p:txBody>
+          <a:bodyPr>
+            <a:normAutofit/>
+          </a:bodyPr>
+          <a:lstStyle/>
+          <a:p>
+            <a:pPr marL="0" indent="0">
+              <a:spcBef>
+                <a:spcPts val="600"/>
+              </a:spcBef>
+              <a:buNone/>
+            </a:pPr>
+            <a:r>
+              <a:rPr lang="en-US" b="1" dirty="0">
+                <a:solidFill>
+                  <a:srgbClr val="0070C0"/>
+                </a:solidFill>
+              </a:rPr>
+              <a:t>Sentences</a:t>
+            </a:r>
+          </a:p>
+          <a:p>
+            <a:pPr marL="0" indent="0">
+              <a:buNone/>
+            </a:pPr>
+            <a:r>
+              <a:rPr lang="en-US" dirty="0"/>
+              <a:t>Put the words in the right order.</a:t>
+            </a:r>
+          </a:p>
+          <a:p>
+            <a:pPr marL="0" indent="0">
+              <a:buNone/>
+            </a:pPr>
+            <a:endParaRPr lang="en-US" dirty="0">
+              <a:solidFill>
+                <a:srgbClr val="00B0F0"/>
+              </a:solidFill>
+            </a:endParaRPr>
+          </a:p>
+          <a:p>
+            <a:pPr marL="514350" indent="-514350">
+              <a:buFont typeface="+mj-lt"/>
+              <a:buAutoNum type="arabicPeriod"/>
+            </a:pPr>
+            <a:r>
+              <a:rPr lang="en-US" dirty="0"/>
+              <a:t>going</a:t>
+            </a:r>
+            <a:r>
+              <a:rPr lang="en-US" baseline="30000" dirty="0">
+                <a:solidFill>
+                  <a:schemeClr val="bg1">
+                    <a:lumMod val="75000"/>
+                  </a:schemeClr>
+                </a:solidFill>
+              </a:rPr>
+              <a:t>3</a:t>
+            </a:r>
+            <a:r>
+              <a:rPr lang="en-US" dirty="0"/>
+              <a:t> to</a:t>
+            </a:r>
+            <a:r>
+              <a:rPr lang="en-US" baseline="30000" dirty="0">
+                <a:solidFill>
+                  <a:schemeClr val="bg1">
+                    <a:lumMod val="75000"/>
+                  </a:schemeClr>
+                </a:solidFill>
+              </a:rPr>
+              <a:t>4</a:t>
+            </a:r>
+            <a:r>
+              <a:rPr lang="en-US" dirty="0"/>
+              <a:t> is</a:t>
+            </a:r>
+            <a:r>
+              <a:rPr lang="en-US" baseline="30000" dirty="0">
+                <a:solidFill>
+                  <a:schemeClr val="bg1">
+                    <a:lumMod val="75000"/>
+                  </a:schemeClr>
+                </a:solidFill>
+              </a:rPr>
+              <a:t>2</a:t>
+            </a:r>
+            <a:r>
+              <a:rPr lang="en-US" dirty="0"/>
+              <a:t> school</a:t>
+            </a:r>
+            <a:r>
+              <a:rPr lang="en-US" baseline="30000" dirty="0">
+                <a:solidFill>
+                  <a:schemeClr val="bg1">
+                    <a:lumMod val="75000"/>
+                  </a:schemeClr>
+                </a:solidFill>
+              </a:rPr>
+              <a:t>5</a:t>
+            </a:r>
+            <a:r>
+              <a:rPr lang="en-US" dirty="0"/>
+              <a:t> Ben</a:t>
+            </a:r>
+            <a:r>
+              <a:rPr lang="en-US" baseline="30000" dirty="0">
+                <a:solidFill>
+                  <a:schemeClr val="bg1">
+                    <a:lumMod val="75000"/>
+                  </a:schemeClr>
+                </a:solidFill>
+              </a:rPr>
+              <a:t>1</a:t>
+            </a:r>
+            <a:r>
+              <a:rPr lang="en-US" dirty="0"/>
+              <a:t>.</a:t>
+            </a:r>
+          </a:p>
+          <a:p>
+            <a:pPr marL="514350" indent="-514350">
+              <a:buFont typeface="+mj-lt"/>
+              <a:buAutoNum type="arabicPeriod"/>
+            </a:pPr>
+            <a:r>
+              <a:rPr lang="en-US" dirty="0"/>
+              <a:t>Daniel</a:t>
+            </a:r>
+            <a:r>
+              <a:rPr lang="en-US" baseline="30000" dirty="0">
+                <a:solidFill>
+                  <a:schemeClr val="bg1">
+                    <a:lumMod val="75000"/>
+                  </a:schemeClr>
+                </a:solidFill>
+              </a:rPr>
+              <a:t>1</a:t>
+            </a:r>
+            <a:r>
+              <a:rPr lang="en-US" dirty="0"/>
+              <a:t> music</a:t>
+            </a:r>
+            <a:r>
+              <a:rPr lang="en-US" baseline="30000" dirty="0">
+                <a:solidFill>
+                  <a:schemeClr val="bg1">
+                    <a:lumMod val="75000"/>
+                  </a:schemeClr>
+                </a:solidFill>
+              </a:rPr>
+              <a:t>5</a:t>
+            </a:r>
+            <a:r>
+              <a:rPr lang="en-US" dirty="0"/>
+              <a:t> to</a:t>
+            </a:r>
+            <a:r>
+              <a:rPr lang="en-US" baseline="30000" dirty="0">
+                <a:solidFill>
+                  <a:schemeClr val="bg1">
+                    <a:lumMod val="75000"/>
+                  </a:schemeClr>
+                </a:solidFill>
+              </a:rPr>
+              <a:t>4</a:t>
+            </a:r>
+            <a:r>
+              <a:rPr lang="en-US" dirty="0"/>
+              <a:t> listening</a:t>
+            </a:r>
+            <a:r>
+              <a:rPr lang="en-US" baseline="30000" dirty="0">
+                <a:solidFill>
+                  <a:schemeClr val="bg1">
+                    <a:lumMod val="75000"/>
+                  </a:schemeClr>
+                </a:solidFill>
+              </a:rPr>
+              <a:t>3</a:t>
+            </a:r>
+            <a:r>
+              <a:rPr lang="en-US" dirty="0"/>
+              <a:t> is</a:t>
+            </a:r>
+            <a:r>
+              <a:rPr lang="en-US" baseline="30000" dirty="0">
+                <a:solidFill>
+                  <a:schemeClr val="bg1">
+                    <a:lumMod val="75000"/>
+                  </a:schemeClr>
+                </a:solidFill>
+              </a:rPr>
+              <a:t> 2</a:t>
+            </a:r>
+            <a:r>
+              <a:rPr lang="en-US" dirty="0"/>
+              <a:t>.</a:t>
+            </a:r>
+          </a:p>
+          <a:p>
+            <a:pPr marL="514350" indent="-514350">
+              <a:buFont typeface="+mj-lt"/>
+              <a:buAutoNum type="arabicPeriod"/>
+            </a:pPr>
+            <a:r>
+              <a:rPr lang="en-US" dirty="0"/>
+              <a:t>playing</a:t>
+            </a:r>
+            <a:r>
+              <a:rPr lang="en-US" baseline="30000" dirty="0">
+                <a:solidFill>
+                  <a:schemeClr val="bg1">
+                    <a:lumMod val="75000"/>
+                  </a:schemeClr>
+                </a:solidFill>
+              </a:rPr>
+              <a:t>3</a:t>
+            </a:r>
+            <a:r>
+              <a:rPr lang="en-US" dirty="0"/>
+              <a:t> Jara</a:t>
+            </a:r>
+            <a:r>
+              <a:rPr lang="en-US" baseline="30000" dirty="0">
+                <a:solidFill>
+                  <a:schemeClr val="bg1">
+                    <a:lumMod val="75000"/>
+                  </a:schemeClr>
+                </a:solidFill>
+              </a:rPr>
+              <a:t>1</a:t>
+            </a:r>
+            <a:r>
+              <a:rPr lang="en-US" dirty="0"/>
+              <a:t> is</a:t>
+            </a:r>
+            <a:r>
+              <a:rPr lang="en-US" baseline="30000" dirty="0">
+                <a:solidFill>
+                  <a:schemeClr val="bg1">
+                    <a:lumMod val="75000"/>
+                  </a:schemeClr>
+                </a:solidFill>
+              </a:rPr>
+              <a:t>2 </a:t>
+            </a:r>
+            <a:r>
+              <a:rPr lang="en-US" dirty="0"/>
+              <a:t>piano</a:t>
+            </a:r>
+            <a:r>
+              <a:rPr lang="en-US" baseline="30000" dirty="0">
+                <a:solidFill>
+                  <a:schemeClr val="bg1">
+                    <a:lumMod val="75000"/>
+                  </a:schemeClr>
+                </a:solidFill>
+              </a:rPr>
+              <a:t>4</a:t>
+            </a:r>
+            <a:r>
+              <a:rPr lang="en-US" dirty="0"/>
+              <a:t>.</a:t>
+            </a:r>
+          </a:p>
+          <a:p>
+            <a:pPr marL="0" indent="0">
+              <a:buNone/>
+            </a:pPr>
+            <a:endParaRPr lang="en-US" dirty="0"/>
+          </a:p>
+          <a:p>
+            <a:pPr marL="514350" indent="-514350">
+              <a:buFont typeface="+mj-lt"/>
+              <a:buAutoNum type="arabicPeriod"/>
+            </a:pPr>
+            <a:endParaRPr lang="en-US" dirty="0"/>
+          </a:p>
+          <a:p>
+            <a:pPr marL="0" indent="0">
+              <a:buNone/>
+            </a:pPr>
+            <a:endParaRPr lang="en-US" dirty="0"/>
+          </a:p>
+          <a:p>
+            <a:pPr marL="0" indent="0">
+              <a:buNone/>
+            </a:pPr>
+            <a:endParaRPr lang="en-US" dirty="0"/>
+          </a:p>
+        </p:txBody>
+      </p:sp>
+    </p:spTree>
+    <p:extLst>
+      <p:ext uri="{BB962C8B-B14F-4D97-AF65-F5344CB8AC3E}">
+        <p14:creationId xmlns:p14="http://schemas.microsoft.com/office/powerpoint/2010/main" val="1907906606"/>
+      </p:ext>
+    </p:extLst>
+  </p:cSld>
+  <p:clrMapOvr>
+    <a:masterClrMapping/>
+  </p:clrMapOvr>
+</p:sld>
+</file>
+
+<file path=ppt/slides/slide26.xml><?xml version="1.0" encoding="utf-8"?>
 <p:sld xmlns:a="http://schemas.openxmlformats.org/drawingml/2006/main" xmlns:r="http://schemas.openxmlformats.org/officeDocument/2006/relationships" xmlns:p="http://schemas.openxmlformats.org/presentationml/2006/main">
   <p:cSld>
     <p:spTree>
@@ -8481,7 +8907,7 @@
 </p:sld>
 </file>
 
-<file path=ppt/slides/slide26.xml><?xml version="1.0" encoding="utf-8"?>
+<file path=ppt/slides/slide27.xml><?xml version="1.0" encoding="utf-8"?>
 <p:sld xmlns:a="http://schemas.openxmlformats.org/drawingml/2006/main" xmlns:r="http://schemas.openxmlformats.org/officeDocument/2006/relationships" xmlns:p="http://schemas.openxmlformats.org/presentationml/2006/main">
   <p:cSld>
     <p:spTree>
@@ -14491,19 +14917,22 @@
             </a:pPr>
             <a:r>
               <a:rPr lang="en-US" dirty="0"/>
-              <a:t>	Cat		</a:t>
-            </a:r>
-            <a:r>
-              <a:rPr lang="en-US" dirty="0">
+              <a:t>	Cat</a:t>
+            </a:r>
+            <a:r>
+              <a:rPr lang="en-US" baseline="30000" dirty="0">
                 <a:solidFill>
                   <a:schemeClr val="bg1">
-                    <a:lumMod val="65000"/>
+                    <a:lumMod val="75000"/>
                   </a:schemeClr>
                 </a:solidFill>
               </a:rPr>
-              <a:t>Donkey</a:t>
-            </a:r>
-            <a:endParaRPr lang="en-US" dirty="0"/>
+              <a:t>3</a:t>
+            </a:r>
+            <a:r>
+              <a:rPr lang="en-US" dirty="0"/>
+              <a:t>		</a:t>
+            </a:r>
           </a:p>
           <a:p>
             <a:pPr marL="0" indent="0">
@@ -14514,18 +14943,29 @@
             </a:pPr>
             <a:r>
               <a:rPr lang="en-US" dirty="0"/>
-              <a:t>	Dog		</a:t>
-            </a:r>
-            <a:r>
-              <a:rPr lang="en-US" dirty="0">
+              <a:t>	Dog</a:t>
+            </a:r>
+            <a:r>
+              <a:rPr lang="en-US" baseline="30000" dirty="0">
                 <a:solidFill>
                   <a:schemeClr val="bg1">
-                    <a:lumMod val="65000"/>
+                    <a:lumMod val="75000"/>
                   </a:schemeClr>
                 </a:solidFill>
               </a:rPr>
-              <a:t>Dog</a:t>
-            </a:r>
+              <a:t>2</a:t>
+            </a:r>
+            <a:r>
+              <a:rPr lang="en-US" dirty="0"/>
+              <a:t>		</a:t>
+            </a:r>
+            <a:endParaRPr lang="en-US" dirty="0">
+              <a:solidFill>
+                <a:schemeClr val="bg1">
+                  <a:lumMod val="65000"/>
+                </a:schemeClr>
+              </a:solidFill>
+            </a:endParaRPr>
           </a:p>
           <a:p>
             <a:pPr marL="0" indent="0">
@@ -14536,18 +14976,29 @@
             </a:pPr>
             <a:r>
               <a:rPr lang="en-US" dirty="0"/>
-              <a:t>	Cock		</a:t>
-            </a:r>
-            <a:r>
-              <a:rPr lang="en-US" dirty="0">
+              <a:t>	Cock</a:t>
+            </a:r>
+            <a:r>
+              <a:rPr lang="en-US" baseline="30000" dirty="0">
                 <a:solidFill>
                   <a:schemeClr val="bg1">
-                    <a:lumMod val="65000"/>
+                    <a:lumMod val="75000"/>
                   </a:schemeClr>
                 </a:solidFill>
               </a:rPr>
-              <a:t>Cat</a:t>
-            </a:r>
+              <a:t>4</a:t>
+            </a:r>
+            <a:r>
+              <a:rPr lang="en-US" dirty="0"/>
+              <a:t>		</a:t>
+            </a:r>
+            <a:endParaRPr lang="en-US" dirty="0">
+              <a:solidFill>
+                <a:schemeClr val="bg1">
+                  <a:lumMod val="65000"/>
+                </a:schemeClr>
+              </a:solidFill>
+            </a:endParaRPr>
           </a:p>
           <a:p>
             <a:pPr marL="0" indent="0">
@@ -14558,18 +15009,29 @@
             </a:pPr>
             <a:r>
               <a:rPr lang="en-US" dirty="0"/>
-              <a:t>	Donkey	</a:t>
-            </a:r>
-            <a:r>
-              <a:rPr lang="en-US" dirty="0">
+              <a:t>	Donkey</a:t>
+            </a:r>
+            <a:r>
+              <a:rPr lang="en-US" baseline="30000" dirty="0">
                 <a:solidFill>
                   <a:schemeClr val="bg1">
-                    <a:lumMod val="65000"/>
+                    <a:lumMod val="75000"/>
                   </a:schemeClr>
                 </a:solidFill>
               </a:rPr>
-              <a:t>Cock</a:t>
-            </a:r>
+              <a:t>1</a:t>
+            </a:r>
+            <a:r>
+              <a:rPr lang="en-US" dirty="0"/>
+              <a:t>	</a:t>
+            </a:r>
+            <a:endParaRPr lang="en-US" dirty="0">
+              <a:solidFill>
+                <a:schemeClr val="bg1">
+                  <a:lumMod val="65000"/>
+                </a:schemeClr>
+              </a:solidFill>
+            </a:endParaRPr>
           </a:p>
         </p:txBody>
       </p:sp>

</xml_diff>